<commit_message>
inserção atores nos diagramas e atualização dg de atividade
</commit_message>
<xml_diff>
--- a/Apresentacao/Apresentação banca.pptx
+++ b/Apresentacao/Apresentação banca.pptx
@@ -105,6 +105,11 @@
       </a:defRPr>
     </a:lvl9pPr>
   </p:defaultTextStyle>
+  <p:extLst>
+    <p:ext uri="{EFAFB233-063F-42B5-8137-9DF3F51BA10A}">
+      <p15:sldGuideLst xmlns:p15="http://schemas.microsoft.com/office/powerpoint/2012/main"/>
+    </p:ext>
+  </p:extLst>
 </p:presentation>
 </file>
 
@@ -255,7 +260,7 @@
           <a:p>
             <a:fld id="{6AAE14AA-E60E-4C8E-A6E0-42A36A6137A1}" type="datetimeFigureOut">
               <a:rPr lang="pt-BR" smtClean="0"/>
-              <a:t>12/11/2020</a:t>
+              <a:t>16/11/2020</a:t>
             </a:fld>
             <a:endParaRPr lang="pt-BR"/>
           </a:p>
@@ -453,7 +458,7 @@
           <a:p>
             <a:fld id="{6AAE14AA-E60E-4C8E-A6E0-42A36A6137A1}" type="datetimeFigureOut">
               <a:rPr lang="pt-BR" smtClean="0"/>
-              <a:t>12/11/2020</a:t>
+              <a:t>16/11/2020</a:t>
             </a:fld>
             <a:endParaRPr lang="pt-BR"/>
           </a:p>
@@ -661,7 +666,7 @@
           <a:p>
             <a:fld id="{6AAE14AA-E60E-4C8E-A6E0-42A36A6137A1}" type="datetimeFigureOut">
               <a:rPr lang="pt-BR" smtClean="0"/>
-              <a:t>12/11/2020</a:t>
+              <a:t>16/11/2020</a:t>
             </a:fld>
             <a:endParaRPr lang="pt-BR"/>
           </a:p>
@@ -859,7 +864,7 @@
           <a:p>
             <a:fld id="{6AAE14AA-E60E-4C8E-A6E0-42A36A6137A1}" type="datetimeFigureOut">
               <a:rPr lang="pt-BR" smtClean="0"/>
-              <a:t>12/11/2020</a:t>
+              <a:t>16/11/2020</a:t>
             </a:fld>
             <a:endParaRPr lang="pt-BR"/>
           </a:p>
@@ -1134,7 +1139,7 @@
           <a:p>
             <a:fld id="{6AAE14AA-E60E-4C8E-A6E0-42A36A6137A1}" type="datetimeFigureOut">
               <a:rPr lang="pt-BR" smtClean="0"/>
-              <a:t>12/11/2020</a:t>
+              <a:t>16/11/2020</a:t>
             </a:fld>
             <a:endParaRPr lang="pt-BR"/>
           </a:p>
@@ -1399,7 +1404,7 @@
           <a:p>
             <a:fld id="{6AAE14AA-E60E-4C8E-A6E0-42A36A6137A1}" type="datetimeFigureOut">
               <a:rPr lang="pt-BR" smtClean="0"/>
-              <a:t>12/11/2020</a:t>
+              <a:t>16/11/2020</a:t>
             </a:fld>
             <a:endParaRPr lang="pt-BR"/>
           </a:p>
@@ -1811,7 +1816,7 @@
           <a:p>
             <a:fld id="{6AAE14AA-E60E-4C8E-A6E0-42A36A6137A1}" type="datetimeFigureOut">
               <a:rPr lang="pt-BR" smtClean="0"/>
-              <a:t>12/11/2020</a:t>
+              <a:t>16/11/2020</a:t>
             </a:fld>
             <a:endParaRPr lang="pt-BR"/>
           </a:p>
@@ -1952,7 +1957,7 @@
           <a:p>
             <a:fld id="{6AAE14AA-E60E-4C8E-A6E0-42A36A6137A1}" type="datetimeFigureOut">
               <a:rPr lang="pt-BR" smtClean="0"/>
-              <a:t>12/11/2020</a:t>
+              <a:t>16/11/2020</a:t>
             </a:fld>
             <a:endParaRPr lang="pt-BR"/>
           </a:p>
@@ -2065,7 +2070,7 @@
           <a:p>
             <a:fld id="{6AAE14AA-E60E-4C8E-A6E0-42A36A6137A1}" type="datetimeFigureOut">
               <a:rPr lang="pt-BR" smtClean="0"/>
-              <a:t>12/11/2020</a:t>
+              <a:t>16/11/2020</a:t>
             </a:fld>
             <a:endParaRPr lang="pt-BR"/>
           </a:p>
@@ -2376,7 +2381,7 @@
           <a:p>
             <a:fld id="{6AAE14AA-E60E-4C8E-A6E0-42A36A6137A1}" type="datetimeFigureOut">
               <a:rPr lang="pt-BR" smtClean="0"/>
-              <a:t>12/11/2020</a:t>
+              <a:t>16/11/2020</a:t>
             </a:fld>
             <a:endParaRPr lang="pt-BR"/>
           </a:p>
@@ -2664,7 +2669,7 @@
           <a:p>
             <a:fld id="{6AAE14AA-E60E-4C8E-A6E0-42A36A6137A1}" type="datetimeFigureOut">
               <a:rPr lang="pt-BR" smtClean="0"/>
-              <a:t>12/11/2020</a:t>
+              <a:t>16/11/2020</a:t>
             </a:fld>
             <a:endParaRPr lang="pt-BR"/>
           </a:p>
@@ -2905,7 +2910,7 @@
           <a:p>
             <a:fld id="{6AAE14AA-E60E-4C8E-A6E0-42A36A6137A1}" type="datetimeFigureOut">
               <a:rPr lang="pt-BR" smtClean="0"/>
-              <a:t>12/11/2020</a:t>
+              <a:t>16/11/2020</a:t>
             </a:fld>
             <a:endParaRPr lang="pt-BR"/>
           </a:p>
@@ -3338,12 +3343,22 @@
             <p:ph type="ctrTitle"/>
           </p:nvPr>
         </p:nvSpPr>
-        <p:spPr/>
-        <p:txBody>
-          <a:bodyPr/>
-          <a:lstStyle/>
-          <a:p>
-            <a:endParaRPr lang="pt-BR" dirty="0"/>
+        <p:spPr>
+          <a:xfrm>
+            <a:off x="1524000" y="234893"/>
+            <a:ext cx="9144000" cy="880844"/>
+          </a:xfrm>
+        </p:spPr>
+        <p:txBody>
+          <a:bodyPr>
+            <a:normAutofit fontScale="90000"/>
+          </a:bodyPr>
+          <a:lstStyle/>
+          <a:p>
+            <a:r>
+              <a:rPr lang="pt-BR" dirty="0"/>
+              <a:t>Gestão de Imobiliária</a:t>
+            </a:r>
           </a:p>
         </p:txBody>
       </p:sp>
@@ -3363,12 +3378,136 @@
             <p:ph type="subTitle" idx="1"/>
           </p:nvPr>
         </p:nvSpPr>
-        <p:spPr/>
-        <p:txBody>
-          <a:bodyPr/>
-          <a:lstStyle/>
-          <a:p>
-            <a:endParaRPr lang="pt-BR"/>
+        <p:spPr>
+          <a:xfrm>
+            <a:off x="1524000" y="1180750"/>
+            <a:ext cx="9144000" cy="4496499"/>
+          </a:xfrm>
+        </p:spPr>
+        <p:txBody>
+          <a:bodyPr>
+            <a:normAutofit/>
+          </a:bodyPr>
+          <a:lstStyle/>
+          <a:p>
+            <a:pPr algn="l"/>
+            <a:r>
+              <a:rPr lang="pt-BR" sz="1100" dirty="0"/>
+              <a:t>---------------PASSO 3 - ADMINISTRADOR---------------------------		OBS: Cadastrar 5 imóveis</a:t>
+            </a:r>
+          </a:p>
+          <a:p>
+            <a:pPr algn="l"/>
+            <a:r>
+              <a:rPr lang="pt-BR" sz="1100" dirty="0"/>
+              <a:t>1 – gerenciar agendamentos				OBS: Cadastrar 5 usuários</a:t>
+            </a:r>
+          </a:p>
+          <a:p>
+            <a:pPr algn="l"/>
+            <a:r>
+              <a:rPr lang="pt-BR" sz="1100" dirty="0"/>
+              <a:t>2 – gerenciar usuários				OBS: Agendamentos (2 no corretor-</a:t>
+            </a:r>
+            <a:r>
+              <a:rPr lang="pt-BR" sz="1100" dirty="0" err="1"/>
+              <a:t>diego</a:t>
+            </a:r>
+            <a:r>
+              <a:rPr lang="pt-BR" sz="1100" dirty="0"/>
+              <a:t> e 1 alocar automático)</a:t>
+            </a:r>
+          </a:p>
+          <a:p>
+            <a:pPr algn="l"/>
+            <a:r>
+              <a:rPr lang="pt-BR" sz="1100" dirty="0"/>
+              <a:t>3 – imprimir relatórios</a:t>
+            </a:r>
+          </a:p>
+          <a:p>
+            <a:pPr algn="l"/>
+            <a:r>
+              <a:rPr lang="pt-BR" sz="1100" dirty="0"/>
+              <a:t>---------------PASSO 1 - USUÁRIO--------------------------</a:t>
+            </a:r>
+          </a:p>
+          <a:p>
+            <a:pPr algn="l"/>
+            <a:r>
+              <a:rPr lang="pt-BR" sz="1100" dirty="0"/>
+              <a:t>1 – utilizar filtro de interesse</a:t>
+            </a:r>
+          </a:p>
+          <a:p>
+            <a:pPr algn="l"/>
+            <a:r>
+              <a:rPr lang="pt-BR" sz="1100" dirty="0"/>
+              <a:t>2 – solicitar 3 agendamentos</a:t>
+            </a:r>
+          </a:p>
+          <a:p>
+            <a:pPr algn="l"/>
+            <a:r>
+              <a:rPr lang="pt-BR" sz="1100" dirty="0"/>
+              <a:t>3 – solicitar agendamento repetido (corretor/imóvel)</a:t>
+            </a:r>
+          </a:p>
+          <a:p>
+            <a:pPr algn="l"/>
+            <a:r>
+              <a:rPr lang="pt-BR" sz="1100" dirty="0"/>
+              <a:t>4 – emitir ficha agendamento</a:t>
+            </a:r>
+          </a:p>
+          <a:p>
+            <a:pPr algn="l"/>
+            <a:r>
+              <a:rPr lang="pt-BR" sz="1100" dirty="0"/>
+              <a:t>5 – cancelar agendamento</a:t>
+            </a:r>
+          </a:p>
+          <a:p>
+            <a:pPr algn="l"/>
+            <a:r>
+              <a:rPr lang="pt-BR" sz="1100" dirty="0"/>
+              <a:t>6 – verificar e-mail</a:t>
+            </a:r>
+          </a:p>
+          <a:p>
+            <a:pPr algn="l"/>
+            <a:r>
+              <a:rPr lang="pt-BR" sz="1100" dirty="0"/>
+              <a:t>---------------PASSO 2 - CORRETOR-------------------------</a:t>
+            </a:r>
+          </a:p>
+          <a:p>
+            <a:pPr algn="l"/>
+            <a:r>
+              <a:rPr lang="pt-BR" sz="1200" dirty="0"/>
+              <a:t>1 – emitir as fichas de agendamento</a:t>
+            </a:r>
+          </a:p>
+          <a:p>
+            <a:pPr algn="l"/>
+            <a:r>
+              <a:rPr lang="pt-BR" sz="1200" dirty="0"/>
+              <a:t>2 – cancelar agendamento</a:t>
+            </a:r>
+          </a:p>
+          <a:p>
+            <a:pPr algn="l"/>
+            <a:r>
+              <a:rPr lang="pt-BR" sz="1200" dirty="0"/>
+              <a:t>3 – concluir agendamento</a:t>
+            </a:r>
+          </a:p>
+          <a:p>
+            <a:pPr algn="l"/>
+            <a:r>
+              <a:rPr lang="pt-BR" sz="1200" dirty="0"/>
+              <a:t>4 – emitir contrato</a:t>
+            </a:r>
           </a:p>
         </p:txBody>
       </p:sp>
@@ -3499,7 +3638,7 @@
           <a:lstStyle/>
           <a:p>
             <a:r>
-              <a:rPr lang="en-US" sz="2900"/>
+              <a:rPr lang="en-US" sz="2900" dirty="0"/>
               <a:t>DIAGRAMA DE ARQUITETURA</a:t>
             </a:r>
           </a:p>

</xml_diff>

<commit_message>
Ajuste no nome do relatorio para minuta, e ao concluir seta o imovel como vendido para nao aparecer no catalogo
</commit_message>
<xml_diff>
--- a/Apresentacao/Apresentação banca.pptx
+++ b/Apresentacao/Apresentação banca.pptx
@@ -260,7 +260,7 @@
           <a:p>
             <a:fld id="{6AAE14AA-E60E-4C8E-A6E0-42A36A6137A1}" type="datetimeFigureOut">
               <a:rPr lang="pt-BR" smtClean="0"/>
-              <a:t>16/11/2020</a:t>
+              <a:t>20/11/2020</a:t>
             </a:fld>
             <a:endParaRPr lang="pt-BR"/>
           </a:p>
@@ -458,7 +458,7 @@
           <a:p>
             <a:fld id="{6AAE14AA-E60E-4C8E-A6E0-42A36A6137A1}" type="datetimeFigureOut">
               <a:rPr lang="pt-BR" smtClean="0"/>
-              <a:t>16/11/2020</a:t>
+              <a:t>20/11/2020</a:t>
             </a:fld>
             <a:endParaRPr lang="pt-BR"/>
           </a:p>
@@ -666,7 +666,7 @@
           <a:p>
             <a:fld id="{6AAE14AA-E60E-4C8E-A6E0-42A36A6137A1}" type="datetimeFigureOut">
               <a:rPr lang="pt-BR" smtClean="0"/>
-              <a:t>16/11/2020</a:t>
+              <a:t>20/11/2020</a:t>
             </a:fld>
             <a:endParaRPr lang="pt-BR"/>
           </a:p>
@@ -864,7 +864,7 @@
           <a:p>
             <a:fld id="{6AAE14AA-E60E-4C8E-A6E0-42A36A6137A1}" type="datetimeFigureOut">
               <a:rPr lang="pt-BR" smtClean="0"/>
-              <a:t>16/11/2020</a:t>
+              <a:t>20/11/2020</a:t>
             </a:fld>
             <a:endParaRPr lang="pt-BR"/>
           </a:p>
@@ -1139,7 +1139,7 @@
           <a:p>
             <a:fld id="{6AAE14AA-E60E-4C8E-A6E0-42A36A6137A1}" type="datetimeFigureOut">
               <a:rPr lang="pt-BR" smtClean="0"/>
-              <a:t>16/11/2020</a:t>
+              <a:t>20/11/2020</a:t>
             </a:fld>
             <a:endParaRPr lang="pt-BR"/>
           </a:p>
@@ -1404,7 +1404,7 @@
           <a:p>
             <a:fld id="{6AAE14AA-E60E-4C8E-A6E0-42A36A6137A1}" type="datetimeFigureOut">
               <a:rPr lang="pt-BR" smtClean="0"/>
-              <a:t>16/11/2020</a:t>
+              <a:t>20/11/2020</a:t>
             </a:fld>
             <a:endParaRPr lang="pt-BR"/>
           </a:p>
@@ -1816,7 +1816,7 @@
           <a:p>
             <a:fld id="{6AAE14AA-E60E-4C8E-A6E0-42A36A6137A1}" type="datetimeFigureOut">
               <a:rPr lang="pt-BR" smtClean="0"/>
-              <a:t>16/11/2020</a:t>
+              <a:t>20/11/2020</a:t>
             </a:fld>
             <a:endParaRPr lang="pt-BR"/>
           </a:p>
@@ -1957,7 +1957,7 @@
           <a:p>
             <a:fld id="{6AAE14AA-E60E-4C8E-A6E0-42A36A6137A1}" type="datetimeFigureOut">
               <a:rPr lang="pt-BR" smtClean="0"/>
-              <a:t>16/11/2020</a:t>
+              <a:t>20/11/2020</a:t>
             </a:fld>
             <a:endParaRPr lang="pt-BR"/>
           </a:p>
@@ -2070,7 +2070,7 @@
           <a:p>
             <a:fld id="{6AAE14AA-E60E-4C8E-A6E0-42A36A6137A1}" type="datetimeFigureOut">
               <a:rPr lang="pt-BR" smtClean="0"/>
-              <a:t>16/11/2020</a:t>
+              <a:t>20/11/2020</a:t>
             </a:fld>
             <a:endParaRPr lang="pt-BR"/>
           </a:p>
@@ -2381,7 +2381,7 @@
           <a:p>
             <a:fld id="{6AAE14AA-E60E-4C8E-A6E0-42A36A6137A1}" type="datetimeFigureOut">
               <a:rPr lang="pt-BR" smtClean="0"/>
-              <a:t>16/11/2020</a:t>
+              <a:t>20/11/2020</a:t>
             </a:fld>
             <a:endParaRPr lang="pt-BR"/>
           </a:p>
@@ -2669,7 +2669,7 @@
           <a:p>
             <a:fld id="{6AAE14AA-E60E-4C8E-A6E0-42A36A6137A1}" type="datetimeFigureOut">
               <a:rPr lang="pt-BR" smtClean="0"/>
-              <a:t>16/11/2020</a:t>
+              <a:t>20/11/2020</a:t>
             </a:fld>
             <a:endParaRPr lang="pt-BR"/>
           </a:p>
@@ -2910,7 +2910,7 @@
           <a:p>
             <a:fld id="{6AAE14AA-E60E-4C8E-A6E0-42A36A6137A1}" type="datetimeFigureOut">
               <a:rPr lang="pt-BR" smtClean="0"/>
-              <a:t>16/11/2020</a:t>
+              <a:t>20/11/2020</a:t>
             </a:fld>
             <a:endParaRPr lang="pt-BR"/>
           </a:p>
@@ -3777,35 +3777,6 @@
           </a:p>
         </p:txBody>
       </p:sp>
-      <p:pic>
-        <p:nvPicPr>
-          <p:cNvPr id="5" name="Imagem 4">
-            <a:extLst>
-              <a:ext uri="{FF2B5EF4-FFF2-40B4-BE49-F238E27FC236}">
-                <a16:creationId xmlns:a16="http://schemas.microsoft.com/office/drawing/2014/main" id="{E912EDF3-355B-4E66-9A88-0AD14EF7AC87}"/>
-              </a:ext>
-            </a:extLst>
-          </p:cNvPr>
-          <p:cNvPicPr>
-            <a:picLocks noChangeAspect="1"/>
-          </p:cNvPicPr>
-          <p:nvPr/>
-        </p:nvPicPr>
-        <p:blipFill rotWithShape="1">
-          <a:blip r:embed="rId2"/>
-          <a:srcRect l="6573"/>
-          <a:stretch/>
-        </p:blipFill>
-        <p:spPr>
-          <a:xfrm>
-            <a:off x="545238" y="858525"/>
-            <a:ext cx="7608304" cy="5211906"/>
-          </a:xfrm>
-          <a:prstGeom prst="rect">
-            <a:avLst/>
-          </a:prstGeom>
-        </p:spPr>
-      </p:pic>
       <p:sp>
         <p:nvSpPr>
           <p:cNvPr id="16" name="Rectangle 15">
@@ -3869,6 +3840,42 @@
           </a:p>
         </p:txBody>
       </p:sp>
+      <p:pic>
+        <p:nvPicPr>
+          <p:cNvPr id="4" name="Imagem 3" descr="Diagrama&#10;&#10;Descrição gerada automaticamente">
+            <a:extLst>
+              <a:ext uri="{FF2B5EF4-FFF2-40B4-BE49-F238E27FC236}">
+                <a16:creationId xmlns:a16="http://schemas.microsoft.com/office/drawing/2014/main" id="{1DBFA502-D98E-4366-8386-936063E015C0}"/>
+              </a:ext>
+            </a:extLst>
+          </p:cNvPr>
+          <p:cNvPicPr>
+            <a:picLocks noChangeAspect="1"/>
+          </p:cNvPicPr>
+          <p:nvPr/>
+        </p:nvPicPr>
+        <p:blipFill>
+          <a:blip r:embed="rId2">
+            <a:extLst>
+              <a:ext uri="{28A0092B-C50C-407E-A947-70E740481C1C}">
+                <a14:useLocalDpi xmlns:a14="http://schemas.microsoft.com/office/drawing/2010/main" val="0"/>
+              </a:ext>
+            </a:extLst>
+          </a:blip>
+          <a:stretch>
+            <a:fillRect/>
+          </a:stretch>
+        </p:blipFill>
+        <p:spPr>
+          <a:xfrm>
+            <a:off x="713625" y="1123632"/>
+            <a:ext cx="6705600" cy="4610100"/>
+          </a:xfrm>
+          <a:prstGeom prst="rect">
+            <a:avLst/>
+          </a:prstGeom>
+        </p:spPr>
+      </p:pic>
     </p:spTree>
     <p:extLst>
       <p:ext uri="{BB962C8B-B14F-4D97-AF65-F5344CB8AC3E}">

</xml_diff>